<commit_message>
added text files and updated powerpoint
</commit_message>
<xml_diff>
--- a/Powerpoint/CSC204 Reel Review Powerpoint Presentation.pptx
+++ b/Powerpoint/CSC204 Reel Review Powerpoint Presentation.pptx
@@ -6,12 +6,15 @@
   </p:sldMasterIdLst>
   <p:sldIdLst>
     <p:sldId id="256" r:id="rId2"/>
-    <p:sldId id="257" r:id="rId3"/>
-    <p:sldId id="258" r:id="rId4"/>
-    <p:sldId id="261" r:id="rId5"/>
-    <p:sldId id="262" r:id="rId6"/>
-    <p:sldId id="260" r:id="rId7"/>
-    <p:sldId id="259" r:id="rId8"/>
+    <p:sldId id="265" r:id="rId3"/>
+    <p:sldId id="264" r:id="rId4"/>
+    <p:sldId id="257" r:id="rId5"/>
+    <p:sldId id="258" r:id="rId6"/>
+    <p:sldId id="261" r:id="rId7"/>
+    <p:sldId id="262" r:id="rId8"/>
+    <p:sldId id="260" r:id="rId9"/>
+    <p:sldId id="259" r:id="rId10"/>
+    <p:sldId id="263" r:id="rId11"/>
   </p:sldIdLst>
   <p:sldSz cx="12192000" cy="6858000"/>
   <p:notesSz cx="6858000" cy="9144000"/>
@@ -3024,7 +3027,7 @@
         </p:nvSpPr>
         <p:spPr>
           <a:xfrm>
-            <a:off x="6767332" y="4796135"/>
+            <a:off x="6767332" y="4888210"/>
             <a:ext cx="3900668" cy="923330"/>
           </a:xfrm>
           <a:prstGeom prst="rect">
@@ -3040,8 +3043,15 @@
           <a:p>
             <a:pPr algn="r"/>
             <a:r>
-              <a:rPr lang="en-US" smtClean="0"/>
+              <a:rPr lang="en-US" dirty="0" smtClean="0"/>
               <a:t>Leonardo Lopez</a:t>
+            </a:r>
+          </a:p>
+          <a:p>
+            <a:pPr algn="r"/>
+            <a:r>
+              <a:rPr lang="en-US" dirty="0" smtClean="0"/>
+              <a:t>Nuha Aldausari</a:t>
             </a:r>
           </a:p>
           <a:p>
@@ -3050,22 +3060,6 @@
               <a:rPr lang="en-US" dirty="0" smtClean="0"/>
               <a:t>Michael Guynn</a:t>
             </a:r>
-          </a:p>
-          <a:p>
-            <a:pPr algn="r"/>
-            <a:r>
-              <a:rPr lang="en-US" dirty="0" err="1" smtClean="0"/>
-              <a:t>Nuha</a:t>
-            </a:r>
-            <a:r>
-              <a:rPr lang="en-US" dirty="0" smtClean="0"/>
-              <a:t> </a:t>
-            </a:r>
-            <a:r>
-              <a:rPr lang="en-US" dirty="0" err="1" smtClean="0"/>
-              <a:t>Aldausari</a:t>
-            </a:r>
-            <a:endParaRPr lang="en-US" dirty="0" smtClean="0"/>
           </a:p>
         </p:txBody>
       </p:sp>
@@ -3089,6 +3083,82 @@
 </p:sld>
 </file>
 
+<file path=ppt/slides/slide10.xml><?xml version="1.0" encoding="utf-8"?>
+<p:sld xmlns:a="http://schemas.openxmlformats.org/drawingml/2006/main" xmlns:r="http://schemas.openxmlformats.org/officeDocument/2006/relationships" xmlns:p="http://schemas.openxmlformats.org/presentationml/2006/main">
+  <p:cSld>
+    <p:spTree>
+      <p:nvGrpSpPr>
+        <p:cNvPr id="1" name=""/>
+        <p:cNvGrpSpPr/>
+        <p:nvPr/>
+      </p:nvGrpSpPr>
+      <p:grpSpPr>
+        <a:xfrm>
+          <a:off x="0" y="0"/>
+          <a:ext cx="0" cy="0"/>
+          <a:chOff x="0" y="0"/>
+          <a:chExt cx="0" cy="0"/>
+        </a:xfrm>
+      </p:grpSpPr>
+      <p:sp>
+        <p:nvSpPr>
+          <p:cNvPr id="2" name="Title 1"/>
+          <p:cNvSpPr>
+            <a:spLocks noGrp="1"/>
+          </p:cNvSpPr>
+          <p:nvPr>
+            <p:ph type="title"/>
+          </p:nvPr>
+        </p:nvSpPr>
+        <p:spPr/>
+        <p:txBody>
+          <a:bodyPr/>
+          <a:lstStyle/>
+          <a:p>
+            <a:r>
+              <a:rPr lang="en-US" dirty="0" smtClean="0"/>
+              <a:t>Here’s the demo</a:t>
+            </a:r>
+            <a:r>
+              <a:rPr lang="mr-IN" dirty="0" smtClean="0"/>
+              <a:t>…</a:t>
+            </a:r>
+            <a:endParaRPr lang="en-US" dirty="0"/>
+          </a:p>
+        </p:txBody>
+      </p:sp>
+      <p:sp>
+        <p:nvSpPr>
+          <p:cNvPr id="3" name="Content Placeholder 2"/>
+          <p:cNvSpPr>
+            <a:spLocks noGrp="1"/>
+          </p:cNvSpPr>
+          <p:nvPr>
+            <p:ph idx="1"/>
+          </p:nvPr>
+        </p:nvSpPr>
+        <p:spPr/>
+        <p:txBody>
+          <a:bodyPr/>
+          <a:lstStyle/>
+          <a:p>
+            <a:endParaRPr lang="en-US" dirty="0"/>
+          </a:p>
+        </p:txBody>
+      </p:sp>
+    </p:spTree>
+    <p:extLst>
+      <p:ext uri="{BB962C8B-B14F-4D97-AF65-F5344CB8AC3E}">
+        <p14:creationId xmlns:p14="http://schemas.microsoft.com/office/powerpoint/2010/main" val="402059511"/>
+      </p:ext>
+    </p:extLst>
+  </p:cSld>
+  <p:clrMapOvr>
+    <a:masterClrMapping/>
+  </p:clrMapOvr>
+</p:sld>
+</file>
+
 <file path=ppt/slides/slide2.xml><?xml version="1.0" encoding="utf-8"?>
 <p:sld xmlns:a="http://schemas.openxmlformats.org/drawingml/2006/main" xmlns:r="http://schemas.openxmlformats.org/officeDocument/2006/relationships" xmlns:p="http://schemas.openxmlformats.org/presentationml/2006/main">
   <p:cSld>
@@ -3108,6 +3178,112 @@
       </p:grpSpPr>
       <p:sp>
         <p:nvSpPr>
+          <p:cNvPr id="6" name="Title 1"/>
+          <p:cNvSpPr>
+            <a:spLocks noGrp="1"/>
+          </p:cNvSpPr>
+          <p:nvPr>
+            <p:ph type="title"/>
+          </p:nvPr>
+        </p:nvSpPr>
+        <p:spPr>
+          <a:xfrm>
+            <a:off x="838200" y="365125"/>
+            <a:ext cx="10515600" cy="1325563"/>
+          </a:xfrm>
+        </p:spPr>
+        <p:txBody>
+          <a:bodyPr/>
+          <a:lstStyle/>
+          <a:p>
+            <a:r>
+              <a:rPr lang="en-US" dirty="0" smtClean="0"/>
+              <a:t>Workload between members</a:t>
+            </a:r>
+            <a:endParaRPr lang="en-US" dirty="0"/>
+          </a:p>
+        </p:txBody>
+      </p:sp>
+      <p:sp>
+        <p:nvSpPr>
+          <p:cNvPr id="7" name="Content Placeholder 2"/>
+          <p:cNvSpPr>
+            <a:spLocks noGrp="1"/>
+          </p:cNvSpPr>
+          <p:nvPr>
+            <p:ph idx="1"/>
+          </p:nvPr>
+        </p:nvSpPr>
+        <p:spPr>
+          <a:xfrm>
+            <a:off x="838200" y="1825625"/>
+            <a:ext cx="10515600" cy="4351338"/>
+          </a:xfrm>
+        </p:spPr>
+        <p:txBody>
+          <a:bodyPr/>
+          <a:lstStyle/>
+          <a:p>
+            <a:pPr marL="0" indent="0">
+              <a:buNone/>
+            </a:pPr>
+            <a:r>
+              <a:rPr lang="en-US" dirty="0" smtClean="0"/>
+              <a:t>Leonardo Lopez: Everything</a:t>
+            </a:r>
+          </a:p>
+          <a:p>
+            <a:pPr marL="0" indent="0">
+              <a:buNone/>
+            </a:pPr>
+            <a:r>
+              <a:rPr lang="en-US" dirty="0" smtClean="0"/>
+              <a:t>Nuha Aldausari:</a:t>
+            </a:r>
+          </a:p>
+          <a:p>
+            <a:pPr marL="0" indent="0">
+              <a:buNone/>
+            </a:pPr>
+            <a:r>
+              <a:rPr lang="en-US" dirty="0" smtClean="0"/>
+              <a:t>Michael Guynn:</a:t>
+            </a:r>
+          </a:p>
+        </p:txBody>
+      </p:sp>
+    </p:spTree>
+    <p:extLst>
+      <p:ext uri="{BB962C8B-B14F-4D97-AF65-F5344CB8AC3E}">
+        <p14:creationId xmlns:p14="http://schemas.microsoft.com/office/powerpoint/2010/main" val="1074969378"/>
+      </p:ext>
+    </p:extLst>
+  </p:cSld>
+  <p:clrMapOvr>
+    <a:masterClrMapping/>
+  </p:clrMapOvr>
+</p:sld>
+</file>
+
+<file path=ppt/slides/slide3.xml><?xml version="1.0" encoding="utf-8"?>
+<p:sld xmlns:a="http://schemas.openxmlformats.org/drawingml/2006/main" xmlns:r="http://schemas.openxmlformats.org/officeDocument/2006/relationships" xmlns:p="http://schemas.openxmlformats.org/presentationml/2006/main">
+  <p:cSld>
+    <p:spTree>
+      <p:nvGrpSpPr>
+        <p:cNvPr id="1" name=""/>
+        <p:cNvGrpSpPr/>
+        <p:nvPr/>
+      </p:nvGrpSpPr>
+      <p:grpSpPr>
+        <a:xfrm>
+          <a:off x="0" y="0"/>
+          <a:ext cx="0" cy="0"/>
+          <a:chOff x="0" y="0"/>
+          <a:chExt cx="0" cy="0"/>
+        </a:xfrm>
+      </p:grpSpPr>
+      <p:sp>
+        <p:nvSpPr>
           <p:cNvPr id="2" name="Title 1"/>
           <p:cNvSpPr>
             <a:spLocks noGrp="1"/>
@@ -3123,7 +3299,116 @@
           <a:p>
             <a:r>
               <a:rPr lang="en-US" dirty="0" smtClean="0"/>
-              <a:t>App ER Diagram</a:t>
+              <a:t>Workload between members</a:t>
+            </a:r>
+            <a:endParaRPr lang="en-US" dirty="0"/>
+          </a:p>
+        </p:txBody>
+      </p:sp>
+      <p:sp>
+        <p:nvSpPr>
+          <p:cNvPr id="3" name="Content Placeholder 2"/>
+          <p:cNvSpPr>
+            <a:spLocks noGrp="1"/>
+          </p:cNvSpPr>
+          <p:nvPr>
+            <p:ph idx="1"/>
+          </p:nvPr>
+        </p:nvSpPr>
+        <p:spPr>
+          <a:xfrm>
+            <a:off x="838200" y="2824223"/>
+            <a:ext cx="10515600" cy="3352740"/>
+          </a:xfrm>
+        </p:spPr>
+        <p:txBody>
+          <a:bodyPr/>
+          <a:lstStyle/>
+          <a:p>
+            <a:pPr marL="0" indent="0">
+              <a:buNone/>
+            </a:pPr>
+            <a:r>
+              <a:rPr lang="en-US" dirty="0" smtClean="0"/>
+              <a:t>Leonardo Lopez: </a:t>
+            </a:r>
+            <a:r>
+              <a:rPr lang="en-US" dirty="0" smtClean="0"/>
+              <a:t>Schema Design, DB Creation </a:t>
+            </a:r>
+            <a:r>
+              <a:rPr lang="en-US" dirty="0" smtClean="0"/>
+              <a:t>Parser, Tags UI, Queries</a:t>
+            </a:r>
+          </a:p>
+          <a:p>
+            <a:pPr marL="0" indent="0">
+              <a:buNone/>
+            </a:pPr>
+            <a:r>
+              <a:rPr lang="en-US" dirty="0" smtClean="0"/>
+              <a:t>Nuha Aldausari: UI Design, Initial Query Design, Recommendation</a:t>
+            </a:r>
+          </a:p>
+          <a:p>
+            <a:pPr marL="0" indent="0">
+              <a:buNone/>
+            </a:pPr>
+            <a:r>
+              <a:rPr lang="en-US" dirty="0" smtClean="0"/>
+              <a:t>Michael Guynn: UI Design, Queries, Bug Fixing, Random enhancements</a:t>
+            </a:r>
+          </a:p>
+        </p:txBody>
+      </p:sp>
+    </p:spTree>
+    <p:extLst>
+      <p:ext uri="{BB962C8B-B14F-4D97-AF65-F5344CB8AC3E}">
+        <p14:creationId xmlns:p14="http://schemas.microsoft.com/office/powerpoint/2010/main" val="37448632"/>
+      </p:ext>
+    </p:extLst>
+  </p:cSld>
+  <p:clrMapOvr>
+    <a:masterClrMapping/>
+  </p:clrMapOvr>
+</p:sld>
+</file>
+
+<file path=ppt/slides/slide4.xml><?xml version="1.0" encoding="utf-8"?>
+<p:sld xmlns:a="http://schemas.openxmlformats.org/drawingml/2006/main" xmlns:r="http://schemas.openxmlformats.org/officeDocument/2006/relationships" xmlns:p="http://schemas.openxmlformats.org/presentationml/2006/main">
+  <p:cSld>
+    <p:spTree>
+      <p:nvGrpSpPr>
+        <p:cNvPr id="1" name=""/>
+        <p:cNvGrpSpPr/>
+        <p:nvPr/>
+      </p:nvGrpSpPr>
+      <p:grpSpPr>
+        <a:xfrm>
+          <a:off x="0" y="0"/>
+          <a:ext cx="0" cy="0"/>
+          <a:chOff x="0" y="0"/>
+          <a:chExt cx="0" cy="0"/>
+        </a:xfrm>
+      </p:grpSpPr>
+      <p:sp>
+        <p:nvSpPr>
+          <p:cNvPr id="2" name="Title 1"/>
+          <p:cNvSpPr>
+            <a:spLocks noGrp="1"/>
+          </p:cNvSpPr>
+          <p:nvPr>
+            <p:ph type="title"/>
+          </p:nvPr>
+        </p:nvSpPr>
+        <p:spPr/>
+        <p:txBody>
+          <a:bodyPr/>
+          <a:lstStyle/>
+          <a:p>
+            <a:r>
+              <a:rPr lang="en-US" dirty="0" smtClean="0"/>
+              <a:t>App Entity Relationship (ER) Diagram</a:t>
             </a:r>
             <a:endParaRPr lang="en-US" dirty="0"/>
           </a:p>
@@ -3153,8 +3438,8 @@
         </p:blipFill>
         <p:spPr>
           <a:xfrm>
-            <a:off x="2367296" y="1825625"/>
-            <a:ext cx="7457407" cy="4351338"/>
+            <a:off x="1851950" y="1524924"/>
+            <a:ext cx="7972754" cy="4652039"/>
           </a:xfrm>
         </p:spPr>
       </p:pic>
@@ -3178,7 +3463,7 @@
 </p:sld>
 </file>
 
-<file path=ppt/slides/slide3.xml><?xml version="1.0" encoding="utf-8"?>
+<file path=ppt/slides/slide5.xml><?xml version="1.0" encoding="utf-8"?>
 <p:sld xmlns:a="http://schemas.openxmlformats.org/drawingml/2006/main" xmlns:r="http://schemas.openxmlformats.org/officeDocument/2006/relationships" xmlns:p="http://schemas.openxmlformats.org/presentationml/2006/main">
   <p:cSld>
     <p:spTree>
@@ -3267,7 +3552,7 @@
 </p:sld>
 </file>
 
-<file path=ppt/slides/slide4.xml><?xml version="1.0" encoding="utf-8"?>
+<file path=ppt/slides/slide6.xml><?xml version="1.0" encoding="utf-8"?>
 <p:sld xmlns:a="http://schemas.openxmlformats.org/drawingml/2006/main" xmlns:r="http://schemas.openxmlformats.org/officeDocument/2006/relationships" xmlns:p="http://schemas.openxmlformats.org/presentationml/2006/main">
   <p:cSld>
     <p:spTree>
@@ -3349,7 +3634,7 @@
 </p:sld>
 </file>
 
-<file path=ppt/slides/slide5.xml><?xml version="1.0" encoding="utf-8"?>
+<file path=ppt/slides/slide7.xml><?xml version="1.0" encoding="utf-8"?>
 <p:sld xmlns:a="http://schemas.openxmlformats.org/drawingml/2006/main" xmlns:r="http://schemas.openxmlformats.org/officeDocument/2006/relationships" xmlns:p="http://schemas.openxmlformats.org/presentationml/2006/main">
   <p:cSld>
     <p:spTree>
@@ -3389,25 +3674,35 @@
           </a:p>
         </p:txBody>
       </p:sp>
-      <p:sp>
-        <p:nvSpPr>
-          <p:cNvPr id="3" name="Content Placeholder 2"/>
-          <p:cNvSpPr>
-            <a:spLocks noGrp="1"/>
-          </p:cNvSpPr>
+      <p:pic>
+        <p:nvPicPr>
+          <p:cNvPr id="4" name="Content Placeholder 3"/>
+          <p:cNvPicPr>
+            <a:picLocks noGrp="1" noChangeAspect="1"/>
+          </p:cNvPicPr>
           <p:nvPr>
             <p:ph idx="1"/>
           </p:nvPr>
-        </p:nvSpPr>
-        <p:spPr/>
-        <p:txBody>
-          <a:bodyPr/>
-          <a:lstStyle/>
-          <a:p>
-            <a:endParaRPr lang="en-US"/>
-          </a:p>
-        </p:txBody>
-      </p:sp>
+        </p:nvPicPr>
+        <p:blipFill>
+          <a:blip r:embed="rId2">
+            <a:extLst>
+              <a:ext uri="{28A0092B-C50C-407E-A947-70E740481C1C}">
+                <a14:useLocalDpi xmlns:a14="http://schemas.microsoft.com/office/drawing/2010/main" val="0"/>
+              </a:ext>
+            </a:extLst>
+          </a:blip>
+          <a:stretch>
+            <a:fillRect/>
+          </a:stretch>
+        </p:blipFill>
+        <p:spPr>
+          <a:xfrm>
+            <a:off x="2352674" y="2235993"/>
+            <a:ext cx="6910705" cy="2607469"/>
+          </a:xfrm>
+        </p:spPr>
+      </p:pic>
     </p:spTree>
     <p:extLst>
       <p:ext uri="{BB962C8B-B14F-4D97-AF65-F5344CB8AC3E}">
@@ -3421,7 +3716,7 @@
 </p:sld>
 </file>
 
-<file path=ppt/slides/slide6.xml><?xml version="1.0" encoding="utf-8"?>
+<file path=ppt/slides/slide8.xml><?xml version="1.0" encoding="utf-8"?>
 <p:sld xmlns:a="http://schemas.openxmlformats.org/drawingml/2006/main" xmlns:r="http://schemas.openxmlformats.org/officeDocument/2006/relationships" xmlns:p="http://schemas.openxmlformats.org/presentationml/2006/main">
   <p:cSld>
     <p:spTree>
@@ -3455,39 +3750,41 @@
           <a:p>
             <a:r>
               <a:rPr lang="en-US" dirty="0" smtClean="0"/>
-              <a:t>High Level Code Design </a:t>
-            </a:r>
-            <a:r>
-              <a:rPr lang="en-US" smtClean="0"/>
-              <a:t>(App Class </a:t>
-            </a:r>
-            <a:r>
-              <a:rPr lang="en-US" dirty="0" smtClean="0"/>
-              <a:t>Diagram)</a:t>
+              <a:t>High Level Code Design (App Class Diagram)</a:t>
             </a:r>
             <a:endParaRPr lang="en-US" dirty="0"/>
           </a:p>
         </p:txBody>
       </p:sp>
-      <p:sp>
-        <p:nvSpPr>
-          <p:cNvPr id="3" name="Content Placeholder 2"/>
-          <p:cNvSpPr>
-            <a:spLocks noGrp="1"/>
-          </p:cNvSpPr>
+      <p:pic>
+        <p:nvPicPr>
+          <p:cNvPr id="4" name="Content Placeholder 3"/>
+          <p:cNvPicPr>
+            <a:picLocks noGrp="1" noChangeAspect="1"/>
+          </p:cNvPicPr>
           <p:nvPr>
             <p:ph idx="1"/>
           </p:nvPr>
-        </p:nvSpPr>
-        <p:spPr/>
-        <p:txBody>
-          <a:bodyPr/>
-          <a:lstStyle/>
-          <a:p>
-            <a:endParaRPr lang="en-US"/>
-          </a:p>
-        </p:txBody>
-      </p:sp>
+        </p:nvPicPr>
+        <p:blipFill>
+          <a:blip r:embed="rId2">
+            <a:extLst>
+              <a:ext uri="{28A0092B-C50C-407E-A947-70E740481C1C}">
+                <a14:useLocalDpi xmlns:a14="http://schemas.microsoft.com/office/drawing/2010/main" val="0"/>
+              </a:ext>
+            </a:extLst>
+          </a:blip>
+          <a:stretch>
+            <a:fillRect/>
+          </a:stretch>
+        </p:blipFill>
+        <p:spPr>
+          <a:xfrm>
+            <a:off x="2257663" y="1570982"/>
+            <a:ext cx="7676673" cy="4795094"/>
+          </a:xfrm>
+        </p:spPr>
+      </p:pic>
     </p:spTree>
     <p:extLst>
       <p:ext uri="{BB962C8B-B14F-4D97-AF65-F5344CB8AC3E}">
@@ -3501,7 +3798,7 @@
 </p:sld>
 </file>
 
-<file path=ppt/slides/slide7.xml><?xml version="1.0" encoding="utf-8"?>
+<file path=ppt/slides/slide9.xml><?xml version="1.0" encoding="utf-8"?>
 <p:sld xmlns:a="http://schemas.openxmlformats.org/drawingml/2006/main" xmlns:r="http://schemas.openxmlformats.org/officeDocument/2006/relationships" xmlns:p="http://schemas.openxmlformats.org/presentationml/2006/main">
   <p:cSld>
     <p:spTree>

</xml_diff>